<commit_message>
Create basic GUI without interactions, Day 16
</commit_message>
<xml_diff>
--- a/Main.python Outputs.pptx
+++ b/Main.python Outputs.pptx
@@ -20,6 +20,7 @@
     <p:sldId id="268" r:id="rId14"/>
     <p:sldId id="269" r:id="rId15"/>
     <p:sldId id="270" r:id="rId16"/>
+    <p:sldId id="271" r:id="rId17"/>
   </p:sldIdLst>
   <p:sldSz cx="12192000" cy="6858000"/>
   <p:notesSz cx="6858000" cy="9144000"/>
@@ -129,7 +130,7 @@
 <file path=ppt/revisionInfo.xml><?xml version="1.0" encoding="utf-8"?>
 <p1510:revInfo xmlns:a="http://schemas.openxmlformats.org/drawingml/2006/main" xmlns:r="http://schemas.openxmlformats.org/officeDocument/2006/relationships" xmlns:p1510="http://schemas.microsoft.com/office/powerpoint/2015/10/main">
   <p1510:revLst>
-    <p1510:client id="{E13490B2-1E45-4610-9623-8DEE7D02CE53}" v="2" dt="2025-07-07T18:38:23.525"/>
+    <p1510:client id="{E13490B2-1E45-4610-9623-8DEE7D02CE53}" v="4" dt="2025-07-08T17:41:37.138"/>
   </p1510:revLst>
 </p1510:revInfo>
 </file>
@@ -139,7 +140,7 @@
   <pc:docChgLst>
     <pc:chgData name="Hrushikesh Gudugunti" userId="57b5ca6df9311485" providerId="LiveId" clId="{E13490B2-1E45-4610-9623-8DEE7D02CE53}"/>
     <pc:docChg chg="custSel addSld modSld">
-      <pc:chgData name="Hrushikesh Gudugunti" userId="57b5ca6df9311485" providerId="LiveId" clId="{E13490B2-1E45-4610-9623-8DEE7D02CE53}" dt="2025-07-07T18:38:28.034" v="10" actId="1076"/>
+      <pc:chgData name="Hrushikesh Gudugunti" userId="57b5ca6df9311485" providerId="LiveId" clId="{E13490B2-1E45-4610-9623-8DEE7D02CE53}" dt="2025-07-08T17:41:39.784" v="19" actId="1076"/>
       <pc:docMkLst>
         <pc:docMk/>
       </pc:docMkLst>
@@ -174,6 +175,37 @@
           </ac:picMkLst>
         </pc:picChg>
       </pc:sldChg>
+      <pc:sldChg chg="addSp delSp modSp new mod">
+        <pc:chgData name="Hrushikesh Gudugunti" userId="57b5ca6df9311485" providerId="LiveId" clId="{E13490B2-1E45-4610-9623-8DEE7D02CE53}" dt="2025-07-08T17:41:39.784" v="19" actId="1076"/>
+        <pc:sldMkLst>
+          <pc:docMk/>
+          <pc:sldMk cId="3255014439" sldId="271"/>
+        </pc:sldMkLst>
+        <pc:spChg chg="add mod">
+          <ac:chgData name="Hrushikesh Gudugunti" userId="57b5ca6df9311485" providerId="LiveId" clId="{E13490B2-1E45-4610-9623-8DEE7D02CE53}" dt="2025-07-08T17:41:21.254" v="14" actId="20577"/>
+          <ac:spMkLst>
+            <pc:docMk/>
+            <pc:sldMk cId="3255014439" sldId="271"/>
+            <ac:spMk id="2" creationId="{87ED0D9E-80FA-430F-2CEC-1CF6216F00B7}"/>
+          </ac:spMkLst>
+        </pc:spChg>
+        <pc:picChg chg="add del mod">
+          <ac:chgData name="Hrushikesh Gudugunti" userId="57b5ca6df9311485" providerId="LiveId" clId="{E13490B2-1E45-4610-9623-8DEE7D02CE53}" dt="2025-07-08T17:41:23.176" v="15" actId="478"/>
+          <ac:picMkLst>
+            <pc:docMk/>
+            <pc:sldMk cId="3255014439" sldId="271"/>
+            <ac:picMk id="3" creationId="{4ED13218-25C7-D22C-2BBB-F163DDC6CA68}"/>
+          </ac:picMkLst>
+        </pc:picChg>
+        <pc:picChg chg="add mod">
+          <ac:chgData name="Hrushikesh Gudugunti" userId="57b5ca6df9311485" providerId="LiveId" clId="{E13490B2-1E45-4610-9623-8DEE7D02CE53}" dt="2025-07-08T17:41:39.784" v="19" actId="1076"/>
+          <ac:picMkLst>
+            <pc:docMk/>
+            <pc:sldMk cId="3255014439" sldId="271"/>
+            <ac:picMk id="5" creationId="{85BC20BD-389E-3C0E-6E90-A77CBC2444CF}"/>
+          </ac:picMkLst>
+        </pc:picChg>
+      </pc:sldChg>
     </pc:docChg>
   </pc:docChgLst>
 </pc:chgInfo>
@@ -328,7 +360,7 @@
           <a:p>
             <a:fld id="{8FCC635E-80FD-4E6C-927E-D5DBF6CE9F47}" type="datetimeFigureOut">
               <a:rPr lang="en-IN" smtClean="0"/>
-              <a:t>07-07-2025</a:t>
+              <a:t>08-07-2025</a:t>
             </a:fld>
             <a:endParaRPr lang="en-IN"/>
           </a:p>
@@ -528,7 +560,7 @@
           <a:p>
             <a:fld id="{8FCC635E-80FD-4E6C-927E-D5DBF6CE9F47}" type="datetimeFigureOut">
               <a:rPr lang="en-IN" smtClean="0"/>
-              <a:t>07-07-2025</a:t>
+              <a:t>08-07-2025</a:t>
             </a:fld>
             <a:endParaRPr lang="en-IN"/>
           </a:p>
@@ -738,7 +770,7 @@
           <a:p>
             <a:fld id="{8FCC635E-80FD-4E6C-927E-D5DBF6CE9F47}" type="datetimeFigureOut">
               <a:rPr lang="en-IN" smtClean="0"/>
-              <a:t>07-07-2025</a:t>
+              <a:t>08-07-2025</a:t>
             </a:fld>
             <a:endParaRPr lang="en-IN"/>
           </a:p>
@@ -938,7 +970,7 @@
           <a:p>
             <a:fld id="{8FCC635E-80FD-4E6C-927E-D5DBF6CE9F47}" type="datetimeFigureOut">
               <a:rPr lang="en-IN" smtClean="0"/>
-              <a:t>07-07-2025</a:t>
+              <a:t>08-07-2025</a:t>
             </a:fld>
             <a:endParaRPr lang="en-IN"/>
           </a:p>
@@ -1214,7 +1246,7 @@
           <a:p>
             <a:fld id="{8FCC635E-80FD-4E6C-927E-D5DBF6CE9F47}" type="datetimeFigureOut">
               <a:rPr lang="en-IN" smtClean="0"/>
-              <a:t>07-07-2025</a:t>
+              <a:t>08-07-2025</a:t>
             </a:fld>
             <a:endParaRPr lang="en-IN"/>
           </a:p>
@@ -1482,7 +1514,7 @@
           <a:p>
             <a:fld id="{8FCC635E-80FD-4E6C-927E-D5DBF6CE9F47}" type="datetimeFigureOut">
               <a:rPr lang="en-IN" smtClean="0"/>
-              <a:t>07-07-2025</a:t>
+              <a:t>08-07-2025</a:t>
             </a:fld>
             <a:endParaRPr lang="en-IN"/>
           </a:p>
@@ -1897,7 +1929,7 @@
           <a:p>
             <a:fld id="{8FCC635E-80FD-4E6C-927E-D5DBF6CE9F47}" type="datetimeFigureOut">
               <a:rPr lang="en-IN" smtClean="0"/>
-              <a:t>07-07-2025</a:t>
+              <a:t>08-07-2025</a:t>
             </a:fld>
             <a:endParaRPr lang="en-IN"/>
           </a:p>
@@ -2039,7 +2071,7 @@
           <a:p>
             <a:fld id="{8FCC635E-80FD-4E6C-927E-D5DBF6CE9F47}" type="datetimeFigureOut">
               <a:rPr lang="en-IN" smtClean="0"/>
-              <a:t>07-07-2025</a:t>
+              <a:t>08-07-2025</a:t>
             </a:fld>
             <a:endParaRPr lang="en-IN"/>
           </a:p>
@@ -2152,7 +2184,7 @@
           <a:p>
             <a:fld id="{8FCC635E-80FD-4E6C-927E-D5DBF6CE9F47}" type="datetimeFigureOut">
               <a:rPr lang="en-IN" smtClean="0"/>
-              <a:t>07-07-2025</a:t>
+              <a:t>08-07-2025</a:t>
             </a:fld>
             <a:endParaRPr lang="en-IN"/>
           </a:p>
@@ -2465,7 +2497,7 @@
           <a:p>
             <a:fld id="{8FCC635E-80FD-4E6C-927E-D5DBF6CE9F47}" type="datetimeFigureOut">
               <a:rPr lang="en-IN" smtClean="0"/>
-              <a:t>07-07-2025</a:t>
+              <a:t>08-07-2025</a:t>
             </a:fld>
             <a:endParaRPr lang="en-IN"/>
           </a:p>
@@ -2754,7 +2786,7 @@
           <a:p>
             <a:fld id="{8FCC635E-80FD-4E6C-927E-D5DBF6CE9F47}" type="datetimeFigureOut">
               <a:rPr lang="en-IN" smtClean="0"/>
-              <a:t>07-07-2025</a:t>
+              <a:t>08-07-2025</a:t>
             </a:fld>
             <a:endParaRPr lang="en-IN"/>
           </a:p>
@@ -2997,7 +3029,7 @@
           <a:p>
             <a:fld id="{8FCC635E-80FD-4E6C-927E-D5DBF6CE9F47}" type="datetimeFigureOut">
               <a:rPr lang="en-IN" smtClean="0"/>
-              <a:t>07-07-2025</a:t>
+              <a:t>08-07-2025</a:t>
             </a:fld>
             <a:endParaRPr lang="en-IN"/>
           </a:p>
@@ -4056,6 +4088,107 @@
     <p:extLst>
       <p:ext uri="{BB962C8B-B14F-4D97-AF65-F5344CB8AC3E}">
         <p14:creationId xmlns:p14="http://schemas.microsoft.com/office/powerpoint/2010/main" val="1826419838"/>
+      </p:ext>
+    </p:extLst>
+  </p:cSld>
+  <p:clrMapOvr>
+    <a:masterClrMapping/>
+  </p:clrMapOvr>
+</p:sld>
+</file>
+
+<file path=ppt/slides/slide16.xml><?xml version="1.0" encoding="utf-8"?>
+<p:sld xmlns:a="http://schemas.openxmlformats.org/drawingml/2006/main" xmlns:r="http://schemas.openxmlformats.org/officeDocument/2006/relationships" xmlns:p="http://schemas.openxmlformats.org/presentationml/2006/main">
+  <p:cSld>
+    <p:spTree>
+      <p:nvGrpSpPr>
+        <p:cNvPr id="1" name=""/>
+        <p:cNvGrpSpPr/>
+        <p:nvPr/>
+      </p:nvGrpSpPr>
+      <p:grpSpPr>
+        <a:xfrm>
+          <a:off x="0" y="0"/>
+          <a:ext cx="0" cy="0"/>
+          <a:chOff x="0" y="0"/>
+          <a:chExt cx="0" cy="0"/>
+        </a:xfrm>
+      </p:grpSpPr>
+      <p:sp>
+        <p:nvSpPr>
+          <p:cNvPr id="2" name="TextBox 1">
+            <a:extLst>
+              <a:ext uri="{FF2B5EF4-FFF2-40B4-BE49-F238E27FC236}">
+                <a16:creationId xmlns:a16="http://schemas.microsoft.com/office/drawing/2014/main" id="{87ED0D9E-80FA-430F-2CEC-1CF6216F00B7}"/>
+              </a:ext>
+            </a:extLst>
+          </p:cNvPr>
+          <p:cNvSpPr txBox="1"/>
+          <p:nvPr/>
+        </p:nvSpPr>
+        <p:spPr>
+          <a:xfrm>
+            <a:off x="4070555" y="1669241"/>
+            <a:ext cx="6096000" cy="707886"/>
+          </a:xfrm>
+          <a:prstGeom prst="rect">
+            <a:avLst/>
+          </a:prstGeom>
+          <a:noFill/>
+        </p:spPr>
+        <p:txBody>
+          <a:bodyPr wrap="square">
+            <a:spAutoFit/>
+          </a:bodyPr>
+          <a:lstStyle/>
+          <a:p>
+            <a:r>
+              <a:rPr lang="en-IN" sz="4000" dirty="0"/>
+              <a:t>Main16.py Output</a:t>
+            </a:r>
+          </a:p>
+        </p:txBody>
+      </p:sp>
+      <p:pic>
+        <p:nvPicPr>
+          <p:cNvPr id="5" name="Picture 4" descr="A screenshot of a computer&#10;&#10;AI-generated content may be incorrect.">
+            <a:extLst>
+              <a:ext uri="{FF2B5EF4-FFF2-40B4-BE49-F238E27FC236}">
+                <a16:creationId xmlns:a16="http://schemas.microsoft.com/office/drawing/2014/main" id="{85BC20BD-389E-3C0E-6E90-A77CBC2444CF}"/>
+              </a:ext>
+            </a:extLst>
+          </p:cNvPr>
+          <p:cNvPicPr>
+            <a:picLocks noChangeAspect="1"/>
+          </p:cNvPicPr>
+          <p:nvPr/>
+        </p:nvPicPr>
+        <p:blipFill>
+          <a:blip r:embed="rId2">
+            <a:extLst>
+              <a:ext uri="{28A0092B-C50C-407E-A947-70E740481C1C}">
+                <a14:useLocalDpi xmlns:a14="http://schemas.microsoft.com/office/drawing/2010/main" val="0"/>
+              </a:ext>
+            </a:extLst>
+          </a:blip>
+          <a:stretch>
+            <a:fillRect/>
+          </a:stretch>
+        </p:blipFill>
+        <p:spPr>
+          <a:xfrm>
+            <a:off x="2514231" y="2377127"/>
+            <a:ext cx="7478169" cy="2610214"/>
+          </a:xfrm>
+          <a:prstGeom prst="rect">
+            <a:avLst/>
+          </a:prstGeom>
+        </p:spPr>
+      </p:pic>
+    </p:spTree>
+    <p:extLst>
+      <p:ext uri="{BB962C8B-B14F-4D97-AF65-F5344CB8AC3E}">
+        <p14:creationId xmlns:p14="http://schemas.microsoft.com/office/powerpoint/2010/main" val="3255014439"/>
       </p:ext>
     </p:extLst>
   </p:cSld>

</xml_diff>